<commit_message>
Add more content about lower bounded wildcards and supplement slide making note of Objects class
</commit_message>
<xml_diff>
--- a/generics-wildcards.pptx
+++ b/generics-wildcards.pptx
@@ -5,13 +5,20 @@
     <p:sldMasterId id="2147483648" r:id="rId1"/>
   </p:sldMasterIdLst>
   <p:notesMasterIdLst>
-    <p:notesMasterId r:id="rId6"/>
+    <p:notesMasterId r:id="rId13"/>
   </p:notesMasterIdLst>
   <p:sldIdLst>
     <p:sldId id="256" r:id="rId2"/>
     <p:sldId id="257" r:id="rId3"/>
     <p:sldId id="258" r:id="rId4"/>
     <p:sldId id="259" r:id="rId5"/>
+    <p:sldId id="260" r:id="rId6"/>
+    <p:sldId id="261" r:id="rId7"/>
+    <p:sldId id="262" r:id="rId8"/>
+    <p:sldId id="263" r:id="rId9"/>
+    <p:sldId id="266" r:id="rId10"/>
+    <p:sldId id="264" r:id="rId11"/>
+    <p:sldId id="265" r:id="rId12"/>
   </p:sldIdLst>
   <p:sldSz cx="12192000" cy="6858000"/>
   <p:notesSz cx="6858000" cy="9144000"/>
@@ -110,6 +117,11 @@
       </a:defRPr>
     </a:lvl9pPr>
   </p:defaultTextStyle>
+  <p:extLst>
+    <p:ext uri="{EFAFB233-063F-42B5-8137-9DF3F51BA10A}">
+      <p15:sldGuideLst xmlns:p15="http://schemas.microsoft.com/office/powerpoint/2012/main"/>
+    </p:ext>
+  </p:extLst>
 </p:presentation>
 </file>
 
@@ -693,7 +705,7 @@
           <a:p>
             <a:fld id="{5FCD526B-5E10-D349-99E1-A34351DA8329}" type="datetimeFigureOut">
               <a:rPr lang="en-US" smtClean="0"/>
-              <a:t>8/30/20</a:t>
+              <a:t>8/31/20</a:t>
             </a:fld>
             <a:endParaRPr lang="en-US"/>
           </a:p>
@@ -891,7 +903,7 @@
           <a:p>
             <a:fld id="{5FCD526B-5E10-D349-99E1-A34351DA8329}" type="datetimeFigureOut">
               <a:rPr lang="en-US" smtClean="0"/>
-              <a:t>8/30/20</a:t>
+              <a:t>8/31/20</a:t>
             </a:fld>
             <a:endParaRPr lang="en-US"/>
           </a:p>
@@ -1099,7 +1111,7 @@
           <a:p>
             <a:fld id="{5FCD526B-5E10-D349-99E1-A34351DA8329}" type="datetimeFigureOut">
               <a:rPr lang="en-US" smtClean="0"/>
-              <a:t>8/30/20</a:t>
+              <a:t>8/31/20</a:t>
             </a:fld>
             <a:endParaRPr lang="en-US"/>
           </a:p>
@@ -1297,7 +1309,7 @@
           <a:p>
             <a:fld id="{5FCD526B-5E10-D349-99E1-A34351DA8329}" type="datetimeFigureOut">
               <a:rPr lang="en-US" smtClean="0"/>
-              <a:t>8/30/20</a:t>
+              <a:t>8/31/20</a:t>
             </a:fld>
             <a:endParaRPr lang="en-US"/>
           </a:p>
@@ -1572,7 +1584,7 @@
           <a:p>
             <a:fld id="{5FCD526B-5E10-D349-99E1-A34351DA8329}" type="datetimeFigureOut">
               <a:rPr lang="en-US" smtClean="0"/>
-              <a:t>8/30/20</a:t>
+              <a:t>8/31/20</a:t>
             </a:fld>
             <a:endParaRPr lang="en-US"/>
           </a:p>
@@ -1837,7 +1849,7 @@
           <a:p>
             <a:fld id="{5FCD526B-5E10-D349-99E1-A34351DA8329}" type="datetimeFigureOut">
               <a:rPr lang="en-US" smtClean="0"/>
-              <a:t>8/30/20</a:t>
+              <a:t>8/31/20</a:t>
             </a:fld>
             <a:endParaRPr lang="en-US"/>
           </a:p>
@@ -2249,7 +2261,7 @@
           <a:p>
             <a:fld id="{5FCD526B-5E10-D349-99E1-A34351DA8329}" type="datetimeFigureOut">
               <a:rPr lang="en-US" smtClean="0"/>
-              <a:t>8/30/20</a:t>
+              <a:t>8/31/20</a:t>
             </a:fld>
             <a:endParaRPr lang="en-US"/>
           </a:p>
@@ -2390,7 +2402,7 @@
           <a:p>
             <a:fld id="{5FCD526B-5E10-D349-99E1-A34351DA8329}" type="datetimeFigureOut">
               <a:rPr lang="en-US" smtClean="0"/>
-              <a:t>8/30/20</a:t>
+              <a:t>8/31/20</a:t>
             </a:fld>
             <a:endParaRPr lang="en-US"/>
           </a:p>
@@ -2503,7 +2515,7 @@
           <a:p>
             <a:fld id="{5FCD526B-5E10-D349-99E1-A34351DA8329}" type="datetimeFigureOut">
               <a:rPr lang="en-US" smtClean="0"/>
-              <a:t>8/30/20</a:t>
+              <a:t>8/31/20</a:t>
             </a:fld>
             <a:endParaRPr lang="en-US"/>
           </a:p>
@@ -2814,7 +2826,7 @@
           <a:p>
             <a:fld id="{5FCD526B-5E10-D349-99E1-A34351DA8329}" type="datetimeFigureOut">
               <a:rPr lang="en-US" smtClean="0"/>
-              <a:t>8/30/20</a:t>
+              <a:t>8/31/20</a:t>
             </a:fld>
             <a:endParaRPr lang="en-US"/>
           </a:p>
@@ -3102,7 +3114,7 @@
           <a:p>
             <a:fld id="{5FCD526B-5E10-D349-99E1-A34351DA8329}" type="datetimeFigureOut">
               <a:rPr lang="en-US" smtClean="0"/>
-              <a:t>8/30/20</a:t>
+              <a:t>8/31/20</a:t>
             </a:fld>
             <a:endParaRPr lang="en-US"/>
           </a:p>
@@ -3343,7 +3355,7 @@
           <a:p>
             <a:fld id="{5FCD526B-5E10-D349-99E1-A34351DA8329}" type="datetimeFigureOut">
               <a:rPr lang="en-US" smtClean="0"/>
-              <a:t>8/30/20</a:t>
+              <a:t>8/31/20</a:t>
             </a:fld>
             <a:endParaRPr lang="en-US"/>
           </a:p>
@@ -3829,6 +3841,262 @@
 </p:sld>
 </file>
 
+<file path=ppt/slides/slide10.xml><?xml version="1.0" encoding="utf-8"?>
+<p:sld xmlns:a="http://schemas.openxmlformats.org/drawingml/2006/main" xmlns:r="http://schemas.openxmlformats.org/officeDocument/2006/relationships" xmlns:p="http://schemas.openxmlformats.org/presentationml/2006/main">
+  <p:cSld>
+    <p:spTree>
+      <p:nvGrpSpPr>
+        <p:cNvPr id="1" name=""/>
+        <p:cNvGrpSpPr/>
+        <p:nvPr/>
+      </p:nvGrpSpPr>
+      <p:grpSpPr>
+        <a:xfrm>
+          <a:off x="0" y="0"/>
+          <a:ext cx="0" cy="0"/>
+          <a:chOff x="0" y="0"/>
+          <a:chExt cx="0" cy="0"/>
+        </a:xfrm>
+      </p:grpSpPr>
+      <p:sp>
+        <p:nvSpPr>
+          <p:cNvPr id="2" name="Title 1">
+            <a:extLst>
+              <a:ext uri="{FF2B5EF4-FFF2-40B4-BE49-F238E27FC236}">
+                <a16:creationId xmlns:a16="http://schemas.microsoft.com/office/drawing/2014/main" id="{1AB25532-C46A-B447-B68B-808551952128}"/>
+              </a:ext>
+            </a:extLst>
+          </p:cNvPr>
+          <p:cNvSpPr>
+            <a:spLocks noGrp="1"/>
+          </p:cNvSpPr>
+          <p:nvPr>
+            <p:ph type="title"/>
+          </p:nvPr>
+        </p:nvSpPr>
+        <p:spPr/>
+        <p:txBody>
+          <a:bodyPr/>
+          <a:lstStyle/>
+          <a:p>
+            <a:r>
+              <a:rPr lang="en-US" dirty="0"/>
+              <a:t>Bounded Wildcards &lt;T&gt;</a:t>
+            </a:r>
+          </a:p>
+        </p:txBody>
+      </p:sp>
+      <p:sp>
+        <p:nvSpPr>
+          <p:cNvPr id="3" name="Content Placeholder 2">
+            <a:extLst>
+              <a:ext uri="{FF2B5EF4-FFF2-40B4-BE49-F238E27FC236}">
+                <a16:creationId xmlns:a16="http://schemas.microsoft.com/office/drawing/2014/main" id="{68C59FA0-D68F-DA40-ACE4-73DFE28E927A}"/>
+              </a:ext>
+            </a:extLst>
+          </p:cNvPr>
+          <p:cNvSpPr>
+            <a:spLocks noGrp="1"/>
+          </p:cNvSpPr>
+          <p:nvPr>
+            <p:ph idx="1"/>
+          </p:nvPr>
+        </p:nvSpPr>
+        <p:spPr/>
+        <p:txBody>
+          <a:bodyPr/>
+          <a:lstStyle/>
+          <a:p>
+            <a:r>
+              <a:rPr lang="en-US" dirty="0"/>
+              <a:t>Bounded wildcard also work with generic parameters, e.g., &lt;T&gt;</a:t>
+            </a:r>
+          </a:p>
+          <a:p>
+            <a:r>
+              <a:rPr lang="en-US" dirty="0"/>
+              <a:t>Reading these can be a little confusing, but seek the intent of what the code conveys</a:t>
+            </a:r>
+          </a:p>
+          <a:p>
+            <a:r>
+              <a:rPr lang="en-US" dirty="0"/>
+              <a:t>Let’s take a look at some concrete examples in the sample code</a:t>
+            </a:r>
+          </a:p>
+          <a:p>
+            <a:endParaRPr lang="en-US" dirty="0"/>
+          </a:p>
+        </p:txBody>
+      </p:sp>
+    </p:spTree>
+    <p:extLst>
+      <p:ext uri="{BB962C8B-B14F-4D97-AF65-F5344CB8AC3E}">
+        <p14:creationId xmlns:p14="http://schemas.microsoft.com/office/powerpoint/2010/main" val="347259398"/>
+      </p:ext>
+    </p:extLst>
+  </p:cSld>
+  <p:clrMapOvr>
+    <a:masterClrMapping/>
+  </p:clrMapOvr>
+</p:sld>
+</file>
+
+<file path=ppt/slides/slide11.xml><?xml version="1.0" encoding="utf-8"?>
+<p:sld xmlns:a="http://schemas.openxmlformats.org/drawingml/2006/main" xmlns:r="http://schemas.openxmlformats.org/officeDocument/2006/relationships" xmlns:p="http://schemas.openxmlformats.org/presentationml/2006/main">
+  <p:cSld>
+    <p:spTree>
+      <p:nvGrpSpPr>
+        <p:cNvPr id="1" name=""/>
+        <p:cNvGrpSpPr/>
+        <p:nvPr/>
+      </p:nvGrpSpPr>
+      <p:grpSpPr>
+        <a:xfrm>
+          <a:off x="0" y="0"/>
+          <a:ext cx="0" cy="0"/>
+          <a:chOff x="0" y="0"/>
+          <a:chExt cx="0" cy="0"/>
+        </a:xfrm>
+      </p:grpSpPr>
+      <p:sp>
+        <p:nvSpPr>
+          <p:cNvPr id="2" name="Title 1">
+            <a:extLst>
+              <a:ext uri="{FF2B5EF4-FFF2-40B4-BE49-F238E27FC236}">
+                <a16:creationId xmlns:a16="http://schemas.microsoft.com/office/drawing/2014/main" id="{A454B587-312D-B74C-941C-044CF4F70584}"/>
+              </a:ext>
+            </a:extLst>
+          </p:cNvPr>
+          <p:cNvSpPr>
+            <a:spLocks noGrp="1"/>
+          </p:cNvSpPr>
+          <p:nvPr>
+            <p:ph type="title"/>
+          </p:nvPr>
+        </p:nvSpPr>
+        <p:spPr/>
+        <p:txBody>
+          <a:bodyPr/>
+          <a:lstStyle/>
+          <a:p>
+            <a:r>
+              <a:rPr lang="en-US" dirty="0"/>
+              <a:t>Supplement: </a:t>
+            </a:r>
+            <a:r>
+              <a:rPr lang="en-US" dirty="0">
+                <a:latin typeface="Andale Mono" panose="020B0509000000000004" pitchFamily="49" charset="0"/>
+              </a:rPr>
+              <a:t>Objects</a:t>
+            </a:r>
+            <a:r>
+              <a:rPr lang="en-US" dirty="0"/>
+              <a:t> Class</a:t>
+            </a:r>
+          </a:p>
+        </p:txBody>
+      </p:sp>
+      <p:sp>
+        <p:nvSpPr>
+          <p:cNvPr id="3" name="Content Placeholder 2">
+            <a:extLst>
+              <a:ext uri="{FF2B5EF4-FFF2-40B4-BE49-F238E27FC236}">
+                <a16:creationId xmlns:a16="http://schemas.microsoft.com/office/drawing/2014/main" id="{9B8FB602-FAFB-B74C-B7A3-20C6A3828A5C}"/>
+              </a:ext>
+            </a:extLst>
+          </p:cNvPr>
+          <p:cNvSpPr>
+            <a:spLocks noGrp="1"/>
+          </p:cNvSpPr>
+          <p:nvPr>
+            <p:ph idx="1"/>
+          </p:nvPr>
+        </p:nvSpPr>
+        <p:spPr/>
+        <p:txBody>
+          <a:bodyPr>
+            <a:normAutofit fontScale="92500"/>
+          </a:bodyPr>
+          <a:lstStyle/>
+          <a:p>
+            <a:r>
+              <a:rPr lang="en-US" dirty="0"/>
+              <a:t>While not related to the current topic, the Java implementations of some of this stuff references a relatively new class: </a:t>
+            </a:r>
+            <a:r>
+              <a:rPr lang="en-US" dirty="0">
+                <a:latin typeface="Andale Mono" panose="020B0509000000000004" pitchFamily="49" charset="0"/>
+              </a:rPr>
+              <a:t>Objects</a:t>
+            </a:r>
+            <a:r>
+              <a:rPr lang="en-US" dirty="0"/>
+              <a:t> </a:t>
+            </a:r>
+          </a:p>
+          <a:p>
+            <a:r>
+              <a:rPr lang="en-US" dirty="0"/>
+              <a:t>(note the “s” on the end)</a:t>
+            </a:r>
+          </a:p>
+          <a:p>
+            <a:r>
+              <a:rPr lang="en-US" dirty="0"/>
+              <a:t>The </a:t>
+            </a:r>
+            <a:r>
+              <a:rPr lang="en-US" dirty="0">
+                <a:latin typeface="Andale Mono" panose="020B0509000000000004" pitchFamily="49" charset="0"/>
+              </a:rPr>
+              <a:t>Objects</a:t>
+            </a:r>
+            <a:r>
+              <a:rPr lang="en-US" dirty="0"/>
+              <a:t> class implements utility methods for operating on objects </a:t>
+            </a:r>
+          </a:p>
+          <a:p>
+            <a:r>
+              <a:rPr lang="en-US" dirty="0"/>
+              <a:t>These utilities include null-safe or null-tolerant methods for computing the hash code of an object, returning a string for an object, and comparing two objects</a:t>
+            </a:r>
+          </a:p>
+          <a:p>
+            <a:r>
+              <a:rPr lang="en-US" dirty="0"/>
+              <a:t>Example: </a:t>
+            </a:r>
+            <a:r>
+              <a:rPr lang="en-US" dirty="0">
+                <a:hlinkClick r:id="rId2"/>
+              </a:rPr>
+              <a:t>https://docs.oracle.com/javase/8/docs/api/java/util/Objects.html#requireNonNull-T</a:t>
+            </a:r>
+            <a:r>
+              <a:rPr lang="en-US">
+                <a:hlinkClick r:id="rId2"/>
+              </a:rPr>
+              <a:t>-</a:t>
+            </a:r>
+            <a:endParaRPr lang="en-US" dirty="0"/>
+          </a:p>
+        </p:txBody>
+      </p:sp>
+    </p:spTree>
+    <p:extLst>
+      <p:ext uri="{BB962C8B-B14F-4D97-AF65-F5344CB8AC3E}">
+        <p14:creationId xmlns:p14="http://schemas.microsoft.com/office/powerpoint/2010/main" val="545729686"/>
+      </p:ext>
+    </p:extLst>
+  </p:cSld>
+  <p:clrMapOvr>
+    <a:masterClrMapping/>
+  </p:clrMapOvr>
+</p:sld>
+</file>
+
 <file path=ppt/slides/slide2.xml><?xml version="1.0" encoding="utf-8"?>
 <p:sld xmlns:a="http://schemas.openxmlformats.org/drawingml/2006/main" xmlns:r="http://schemas.openxmlformats.org/officeDocument/2006/relationships" xmlns:p="http://schemas.openxmlformats.org/presentationml/2006/main">
   <p:cSld>
@@ -4299,6 +4567,642 @@
     <p:extLst>
       <p:ext uri="{BB962C8B-B14F-4D97-AF65-F5344CB8AC3E}">
         <p14:creationId xmlns:p14="http://schemas.microsoft.com/office/powerpoint/2010/main" val="1246767708"/>
+      </p:ext>
+    </p:extLst>
+  </p:cSld>
+  <p:clrMapOvr>
+    <a:masterClrMapping/>
+  </p:clrMapOvr>
+</p:sld>
+</file>
+
+<file path=ppt/slides/slide5.xml><?xml version="1.0" encoding="utf-8"?>
+<p:sld xmlns:a="http://schemas.openxmlformats.org/drawingml/2006/main" xmlns:r="http://schemas.openxmlformats.org/officeDocument/2006/relationships" xmlns:p="http://schemas.openxmlformats.org/presentationml/2006/main">
+  <p:cSld>
+    <p:spTree>
+      <p:nvGrpSpPr>
+        <p:cNvPr id="1" name=""/>
+        <p:cNvGrpSpPr/>
+        <p:nvPr/>
+      </p:nvGrpSpPr>
+      <p:grpSpPr>
+        <a:xfrm>
+          <a:off x="0" y="0"/>
+          <a:ext cx="0" cy="0"/>
+          <a:chOff x="0" y="0"/>
+          <a:chExt cx="0" cy="0"/>
+        </a:xfrm>
+      </p:grpSpPr>
+      <p:sp>
+        <p:nvSpPr>
+          <p:cNvPr id="2" name="Title 1">
+            <a:extLst>
+              <a:ext uri="{FF2B5EF4-FFF2-40B4-BE49-F238E27FC236}">
+                <a16:creationId xmlns:a16="http://schemas.microsoft.com/office/drawing/2014/main" id="{7D82D76B-0092-E248-9601-B2624C03B032}"/>
+              </a:ext>
+            </a:extLst>
+          </p:cNvPr>
+          <p:cNvSpPr>
+            <a:spLocks noGrp="1"/>
+          </p:cNvSpPr>
+          <p:nvPr>
+            <p:ph type="title"/>
+          </p:nvPr>
+        </p:nvSpPr>
+        <p:spPr/>
+        <p:txBody>
+          <a:bodyPr/>
+          <a:lstStyle/>
+          <a:p>
+            <a:r>
+              <a:rPr lang="en-US" dirty="0"/>
+              <a:t>Upper Bounded Wildcard</a:t>
+            </a:r>
+          </a:p>
+        </p:txBody>
+      </p:sp>
+      <p:sp>
+        <p:nvSpPr>
+          <p:cNvPr id="3" name="Content Placeholder 2">
+            <a:extLst>
+              <a:ext uri="{FF2B5EF4-FFF2-40B4-BE49-F238E27FC236}">
+                <a16:creationId xmlns:a16="http://schemas.microsoft.com/office/drawing/2014/main" id="{61A9448E-7603-1345-B78D-3392F8EF3201}"/>
+              </a:ext>
+            </a:extLst>
+          </p:cNvPr>
+          <p:cNvSpPr>
+            <a:spLocks noGrp="1"/>
+          </p:cNvSpPr>
+          <p:nvPr>
+            <p:ph idx="1"/>
+          </p:nvPr>
+        </p:nvSpPr>
+        <p:spPr/>
+        <p:txBody>
+          <a:bodyPr/>
+          <a:lstStyle/>
+          <a:p>
+            <a:r>
+              <a:rPr lang="en-US" dirty="0"/>
+              <a:t>Used When we need to pass collection of subtypes into methods that take collection of more general type</a:t>
+            </a:r>
+          </a:p>
+          <a:p>
+            <a:r>
+              <a:rPr lang="en-US" dirty="0"/>
+              <a:t>The passed-in collection is used as a producer of values</a:t>
+            </a:r>
+          </a:p>
+          <a:p>
+            <a:pPr lvl="1"/>
+            <a:r>
+              <a:rPr lang="en-US" dirty="0"/>
+              <a:t>In other words, it’s simply read-from but not written to</a:t>
+            </a:r>
+          </a:p>
+          <a:p>
+            <a:r>
+              <a:rPr lang="en-US" dirty="0"/>
+              <a:t>The upper bounded wildcard turns what was contravariant into something that is covariant</a:t>
+            </a:r>
+          </a:p>
+        </p:txBody>
+      </p:sp>
+    </p:spTree>
+    <p:extLst>
+      <p:ext uri="{BB962C8B-B14F-4D97-AF65-F5344CB8AC3E}">
+        <p14:creationId xmlns:p14="http://schemas.microsoft.com/office/powerpoint/2010/main" val="3393123603"/>
+      </p:ext>
+    </p:extLst>
+  </p:cSld>
+  <p:clrMapOvr>
+    <a:masterClrMapping/>
+  </p:clrMapOvr>
+</p:sld>
+</file>
+
+<file path=ppt/slides/slide6.xml><?xml version="1.0" encoding="utf-8"?>
+<p:sld xmlns:a="http://schemas.openxmlformats.org/drawingml/2006/main" xmlns:r="http://schemas.openxmlformats.org/officeDocument/2006/relationships" xmlns:p="http://schemas.openxmlformats.org/presentationml/2006/main">
+  <p:cSld>
+    <p:spTree>
+      <p:nvGrpSpPr>
+        <p:cNvPr id="1" name=""/>
+        <p:cNvGrpSpPr/>
+        <p:nvPr/>
+      </p:nvGrpSpPr>
+      <p:grpSpPr>
+        <a:xfrm>
+          <a:off x="0" y="0"/>
+          <a:ext cx="0" cy="0"/>
+          <a:chOff x="0" y="0"/>
+          <a:chExt cx="0" cy="0"/>
+        </a:xfrm>
+      </p:grpSpPr>
+      <p:sp>
+        <p:nvSpPr>
+          <p:cNvPr id="2" name="Title 1">
+            <a:extLst>
+              <a:ext uri="{FF2B5EF4-FFF2-40B4-BE49-F238E27FC236}">
+                <a16:creationId xmlns:a16="http://schemas.microsoft.com/office/drawing/2014/main" id="{7D82D76B-0092-E248-9601-B2624C03B032}"/>
+              </a:ext>
+            </a:extLst>
+          </p:cNvPr>
+          <p:cNvSpPr>
+            <a:spLocks noGrp="1"/>
+          </p:cNvSpPr>
+          <p:nvPr>
+            <p:ph type="title"/>
+          </p:nvPr>
+        </p:nvSpPr>
+        <p:spPr/>
+        <p:txBody>
+          <a:bodyPr/>
+          <a:lstStyle/>
+          <a:p>
+            <a:r>
+              <a:rPr lang="en-US" dirty="0"/>
+              <a:t>Upper Bounded Wildcard</a:t>
+            </a:r>
+          </a:p>
+        </p:txBody>
+      </p:sp>
+      <p:sp>
+        <p:nvSpPr>
+          <p:cNvPr id="3" name="Content Placeholder 2">
+            <a:extLst>
+              <a:ext uri="{FF2B5EF4-FFF2-40B4-BE49-F238E27FC236}">
+                <a16:creationId xmlns:a16="http://schemas.microsoft.com/office/drawing/2014/main" id="{61A9448E-7603-1345-B78D-3392F8EF3201}"/>
+              </a:ext>
+            </a:extLst>
+          </p:cNvPr>
+          <p:cNvSpPr>
+            <a:spLocks noGrp="1"/>
+          </p:cNvSpPr>
+          <p:nvPr>
+            <p:ph idx="1"/>
+          </p:nvPr>
+        </p:nvSpPr>
+        <p:spPr/>
+        <p:txBody>
+          <a:bodyPr/>
+          <a:lstStyle/>
+          <a:p>
+            <a:r>
+              <a:rPr lang="en-US" dirty="0"/>
+              <a:t>Uses </a:t>
+            </a:r>
+            <a:r>
+              <a:rPr lang="en-US" dirty="0">
+                <a:latin typeface="Andale Mono" panose="020B0509000000000004" pitchFamily="49" charset="0"/>
+              </a:rPr>
+              <a:t>extends</a:t>
+            </a:r>
+            <a:br>
+              <a:rPr lang="en-US" dirty="0"/>
+            </a:br>
+            <a:endParaRPr lang="en-US" dirty="0"/>
+          </a:p>
+          <a:p>
+            <a:pPr marL="457200" lvl="1" indent="0">
+              <a:buNone/>
+            </a:pPr>
+            <a:r>
+              <a:rPr lang="en-US" sz="1800" dirty="0">
+                <a:latin typeface="Andale Mono" panose="020B0509000000000004" pitchFamily="49" charset="0"/>
+              </a:rPr>
+              <a:t>void </a:t>
+            </a:r>
+            <a:r>
+              <a:rPr lang="en-US" sz="1800" dirty="0" err="1">
+                <a:latin typeface="Andale Mono" panose="020B0509000000000004" pitchFamily="49" charset="0"/>
+              </a:rPr>
+              <a:t>myMethod</a:t>
+            </a:r>
+            <a:r>
+              <a:rPr lang="en-US" sz="1800" dirty="0">
+                <a:latin typeface="Andale Mono" panose="020B0509000000000004" pitchFamily="49" charset="0"/>
+              </a:rPr>
+              <a:t>(List&lt;? extends Number&gt; </a:t>
+            </a:r>
+            <a:r>
+              <a:rPr lang="en-US" sz="1800" dirty="0" err="1">
+                <a:latin typeface="Andale Mono" panose="020B0509000000000004" pitchFamily="49" charset="0"/>
+              </a:rPr>
+              <a:t>dataProducer</a:t>
+            </a:r>
+            <a:r>
+              <a:rPr lang="en-US" sz="1800" dirty="0">
+                <a:latin typeface="Andale Mono" panose="020B0509000000000004" pitchFamily="49" charset="0"/>
+              </a:rPr>
+              <a:t>) { … }</a:t>
+            </a:r>
+          </a:p>
+          <a:p>
+            <a:pPr marL="457200" lvl="1" indent="0">
+              <a:buNone/>
+            </a:pPr>
+            <a:r>
+              <a:rPr lang="en-US" sz="1800" dirty="0">
+                <a:latin typeface="Andale Mono" panose="020B0509000000000004" pitchFamily="49" charset="0"/>
+              </a:rPr>
+              <a:t>	// this method will accept List&lt;Integer&gt;, List&lt;Double&gt;, etc.</a:t>
+            </a:r>
+          </a:p>
+          <a:p>
+            <a:pPr marL="457200" lvl="1" indent="0">
+              <a:buNone/>
+            </a:pPr>
+            <a:r>
+              <a:rPr lang="en-US" sz="1800" dirty="0">
+                <a:latin typeface="Andale Mono" panose="020B0509000000000004" pitchFamily="49" charset="0"/>
+              </a:rPr>
+              <a:t>	// and we’ll be able to read from it and use Number methods</a:t>
+            </a:r>
+          </a:p>
+        </p:txBody>
+      </p:sp>
+    </p:spTree>
+    <p:extLst>
+      <p:ext uri="{BB962C8B-B14F-4D97-AF65-F5344CB8AC3E}">
+        <p14:creationId xmlns:p14="http://schemas.microsoft.com/office/powerpoint/2010/main" val="2995394334"/>
+      </p:ext>
+    </p:extLst>
+  </p:cSld>
+  <p:clrMapOvr>
+    <a:masterClrMapping/>
+  </p:clrMapOvr>
+</p:sld>
+</file>
+
+<file path=ppt/slides/slide7.xml><?xml version="1.0" encoding="utf-8"?>
+<p:sld xmlns:a="http://schemas.openxmlformats.org/drawingml/2006/main" xmlns:r="http://schemas.openxmlformats.org/officeDocument/2006/relationships" xmlns:p="http://schemas.openxmlformats.org/presentationml/2006/main">
+  <p:cSld>
+    <p:spTree>
+      <p:nvGrpSpPr>
+        <p:cNvPr id="1" name=""/>
+        <p:cNvGrpSpPr/>
+        <p:nvPr/>
+      </p:nvGrpSpPr>
+      <p:grpSpPr>
+        <a:xfrm>
+          <a:off x="0" y="0"/>
+          <a:ext cx="0" cy="0"/>
+          <a:chOff x="0" y="0"/>
+          <a:chExt cx="0" cy="0"/>
+        </a:xfrm>
+      </p:grpSpPr>
+      <p:sp>
+        <p:nvSpPr>
+          <p:cNvPr id="2" name="Title 1">
+            <a:extLst>
+              <a:ext uri="{FF2B5EF4-FFF2-40B4-BE49-F238E27FC236}">
+                <a16:creationId xmlns:a16="http://schemas.microsoft.com/office/drawing/2014/main" id="{7D82D76B-0092-E248-9601-B2624C03B032}"/>
+              </a:ext>
+            </a:extLst>
+          </p:cNvPr>
+          <p:cNvSpPr>
+            <a:spLocks noGrp="1"/>
+          </p:cNvSpPr>
+          <p:nvPr>
+            <p:ph type="title"/>
+          </p:nvPr>
+        </p:nvSpPr>
+        <p:spPr/>
+        <p:txBody>
+          <a:bodyPr/>
+          <a:lstStyle/>
+          <a:p>
+            <a:r>
+              <a:rPr lang="en-US" dirty="0"/>
+              <a:t>Lower Bounded Wildcard</a:t>
+            </a:r>
+          </a:p>
+        </p:txBody>
+      </p:sp>
+      <p:sp>
+        <p:nvSpPr>
+          <p:cNvPr id="3" name="Content Placeholder 2">
+            <a:extLst>
+              <a:ext uri="{FF2B5EF4-FFF2-40B4-BE49-F238E27FC236}">
+                <a16:creationId xmlns:a16="http://schemas.microsoft.com/office/drawing/2014/main" id="{61A9448E-7603-1345-B78D-3392F8EF3201}"/>
+              </a:ext>
+            </a:extLst>
+          </p:cNvPr>
+          <p:cNvSpPr>
+            <a:spLocks noGrp="1"/>
+          </p:cNvSpPr>
+          <p:nvPr>
+            <p:ph idx="1"/>
+          </p:nvPr>
+        </p:nvSpPr>
+        <p:spPr/>
+        <p:txBody>
+          <a:bodyPr/>
+          <a:lstStyle/>
+          <a:p>
+            <a:r>
+              <a:rPr lang="en-US" dirty="0"/>
+              <a:t>Used when we need to pass collection of subtypes into methods that take collection of more general type</a:t>
+            </a:r>
+          </a:p>
+          <a:p>
+            <a:r>
+              <a:rPr lang="en-US" dirty="0"/>
+              <a:t>The passed-in collection is used as a consumer of values</a:t>
+            </a:r>
+          </a:p>
+          <a:p>
+            <a:pPr lvl="1"/>
+            <a:r>
+              <a:rPr lang="en-US" dirty="0"/>
+              <a:t>In other words, it’s written-to but not read-from</a:t>
+            </a:r>
+          </a:p>
+          <a:p>
+            <a:r>
+              <a:rPr lang="en-US" dirty="0"/>
+              <a:t>The lower bounded wildcard turns what was contravariant into something that is covariant</a:t>
+            </a:r>
+          </a:p>
+        </p:txBody>
+      </p:sp>
+    </p:spTree>
+    <p:extLst>
+      <p:ext uri="{BB962C8B-B14F-4D97-AF65-F5344CB8AC3E}">
+        <p14:creationId xmlns:p14="http://schemas.microsoft.com/office/powerpoint/2010/main" val="2371259135"/>
+      </p:ext>
+    </p:extLst>
+  </p:cSld>
+  <p:clrMapOvr>
+    <a:masterClrMapping/>
+  </p:clrMapOvr>
+</p:sld>
+</file>
+
+<file path=ppt/slides/slide8.xml><?xml version="1.0" encoding="utf-8"?>
+<p:sld xmlns:a="http://schemas.openxmlformats.org/drawingml/2006/main" xmlns:r="http://schemas.openxmlformats.org/officeDocument/2006/relationships" xmlns:p="http://schemas.openxmlformats.org/presentationml/2006/main">
+  <p:cSld>
+    <p:spTree>
+      <p:nvGrpSpPr>
+        <p:cNvPr id="1" name=""/>
+        <p:cNvGrpSpPr/>
+        <p:nvPr/>
+      </p:nvGrpSpPr>
+      <p:grpSpPr>
+        <a:xfrm>
+          <a:off x="0" y="0"/>
+          <a:ext cx="0" cy="0"/>
+          <a:chOff x="0" y="0"/>
+          <a:chExt cx="0" cy="0"/>
+        </a:xfrm>
+      </p:grpSpPr>
+      <p:sp>
+        <p:nvSpPr>
+          <p:cNvPr id="2" name="Title 1">
+            <a:extLst>
+              <a:ext uri="{FF2B5EF4-FFF2-40B4-BE49-F238E27FC236}">
+                <a16:creationId xmlns:a16="http://schemas.microsoft.com/office/drawing/2014/main" id="{7D82D76B-0092-E248-9601-B2624C03B032}"/>
+              </a:ext>
+            </a:extLst>
+          </p:cNvPr>
+          <p:cNvSpPr>
+            <a:spLocks noGrp="1"/>
+          </p:cNvSpPr>
+          <p:nvPr>
+            <p:ph type="title"/>
+          </p:nvPr>
+        </p:nvSpPr>
+        <p:spPr/>
+        <p:txBody>
+          <a:bodyPr/>
+          <a:lstStyle/>
+          <a:p>
+            <a:r>
+              <a:rPr lang="en-US" dirty="0"/>
+              <a:t>Lower Bounded Wildcard</a:t>
+            </a:r>
+          </a:p>
+        </p:txBody>
+      </p:sp>
+      <p:sp>
+        <p:nvSpPr>
+          <p:cNvPr id="3" name="Content Placeholder 2">
+            <a:extLst>
+              <a:ext uri="{FF2B5EF4-FFF2-40B4-BE49-F238E27FC236}">
+                <a16:creationId xmlns:a16="http://schemas.microsoft.com/office/drawing/2014/main" id="{61A9448E-7603-1345-B78D-3392F8EF3201}"/>
+              </a:ext>
+            </a:extLst>
+          </p:cNvPr>
+          <p:cNvSpPr>
+            <a:spLocks noGrp="1"/>
+          </p:cNvSpPr>
+          <p:nvPr>
+            <p:ph idx="1"/>
+          </p:nvPr>
+        </p:nvSpPr>
+        <p:spPr/>
+        <p:txBody>
+          <a:bodyPr/>
+          <a:lstStyle/>
+          <a:p>
+            <a:r>
+              <a:rPr lang="en-US" dirty="0"/>
+              <a:t>Uses </a:t>
+            </a:r>
+            <a:r>
+              <a:rPr lang="en-US" dirty="0">
+                <a:latin typeface="Andale Mono" panose="020B0509000000000004" pitchFamily="49" charset="0"/>
+              </a:rPr>
+              <a:t>super</a:t>
+            </a:r>
+            <a:br>
+              <a:rPr lang="en-US" dirty="0"/>
+            </a:br>
+            <a:endParaRPr lang="en-US" dirty="0"/>
+          </a:p>
+          <a:p>
+            <a:pPr marL="457200" lvl="1" indent="0">
+              <a:buNone/>
+            </a:pPr>
+            <a:r>
+              <a:rPr lang="en-US" sz="1800" dirty="0">
+                <a:latin typeface="Andale Mono" panose="020B0509000000000004" pitchFamily="49" charset="0"/>
+              </a:rPr>
+              <a:t>void </a:t>
+            </a:r>
+            <a:r>
+              <a:rPr lang="en-US" sz="1800" dirty="0" err="1">
+                <a:latin typeface="Andale Mono" panose="020B0509000000000004" pitchFamily="49" charset="0"/>
+              </a:rPr>
+              <a:t>myMethod</a:t>
+            </a:r>
+            <a:r>
+              <a:rPr lang="en-US" sz="1800" dirty="0">
+                <a:latin typeface="Andale Mono" panose="020B0509000000000004" pitchFamily="49" charset="0"/>
+              </a:rPr>
+              <a:t>(List&lt;? super Number&gt; </a:t>
+            </a:r>
+            <a:r>
+              <a:rPr lang="en-US" sz="1800" dirty="0" err="1">
+                <a:latin typeface="Andale Mono" panose="020B0509000000000004" pitchFamily="49" charset="0"/>
+              </a:rPr>
+              <a:t>dataConsumer</a:t>
+            </a:r>
+            <a:r>
+              <a:rPr lang="en-US" sz="1800" dirty="0">
+                <a:latin typeface="Andale Mono" panose="020B0509000000000004" pitchFamily="49" charset="0"/>
+              </a:rPr>
+              <a:t>) { … }</a:t>
+            </a:r>
+          </a:p>
+          <a:p>
+            <a:pPr marL="457200" lvl="1" indent="0">
+              <a:buNone/>
+            </a:pPr>
+            <a:r>
+              <a:rPr lang="en-US" sz="1800" dirty="0">
+                <a:latin typeface="Andale Mono" panose="020B0509000000000004" pitchFamily="49" charset="0"/>
+              </a:rPr>
+              <a:t>	// this method will accept List&lt;Integer&gt;, List&lt;Double&gt;, etc.</a:t>
+            </a:r>
+          </a:p>
+          <a:p>
+            <a:pPr marL="457200" lvl="1" indent="0">
+              <a:buNone/>
+            </a:pPr>
+            <a:r>
+              <a:rPr lang="en-US" sz="1800" dirty="0">
+                <a:latin typeface="Andale Mono" panose="020B0509000000000004" pitchFamily="49" charset="0"/>
+              </a:rPr>
+              <a:t>	// and we’ll be able to write to it and use Number method or</a:t>
+            </a:r>
+          </a:p>
+          <a:p>
+            <a:pPr marL="457200" lvl="1" indent="0">
+              <a:buNone/>
+            </a:pPr>
+            <a:r>
+              <a:rPr lang="en-US" sz="1800" dirty="0">
+                <a:latin typeface="Andale Mono" panose="020B0509000000000004" pitchFamily="49" charset="0"/>
+              </a:rPr>
+              <a:t>	// methods from ancestors of Number</a:t>
+            </a:r>
+          </a:p>
+        </p:txBody>
+      </p:sp>
+    </p:spTree>
+    <p:extLst>
+      <p:ext uri="{BB962C8B-B14F-4D97-AF65-F5344CB8AC3E}">
+        <p14:creationId xmlns:p14="http://schemas.microsoft.com/office/powerpoint/2010/main" val="2885893914"/>
+      </p:ext>
+    </p:extLst>
+  </p:cSld>
+  <p:clrMapOvr>
+    <a:masterClrMapping/>
+  </p:clrMapOvr>
+</p:sld>
+</file>
+
+<file path=ppt/slides/slide9.xml><?xml version="1.0" encoding="utf-8"?>
+<p:sld xmlns:a="http://schemas.openxmlformats.org/drawingml/2006/main" xmlns:r="http://schemas.openxmlformats.org/officeDocument/2006/relationships" xmlns:p="http://schemas.openxmlformats.org/presentationml/2006/main">
+  <p:cSld>
+    <p:spTree>
+      <p:nvGrpSpPr>
+        <p:cNvPr id="1" name=""/>
+        <p:cNvGrpSpPr/>
+        <p:nvPr/>
+      </p:nvGrpSpPr>
+      <p:grpSpPr>
+        <a:xfrm>
+          <a:off x="0" y="0"/>
+          <a:ext cx="0" cy="0"/>
+          <a:chOff x="0" y="0"/>
+          <a:chExt cx="0" cy="0"/>
+        </a:xfrm>
+      </p:grpSpPr>
+      <p:sp>
+        <p:nvSpPr>
+          <p:cNvPr id="2" name="Title 1">
+            <a:extLst>
+              <a:ext uri="{FF2B5EF4-FFF2-40B4-BE49-F238E27FC236}">
+                <a16:creationId xmlns:a16="http://schemas.microsoft.com/office/drawing/2014/main" id="{A71EED8E-50B5-224E-95A7-36A245EF2C8C}"/>
+              </a:ext>
+            </a:extLst>
+          </p:cNvPr>
+          <p:cNvSpPr>
+            <a:spLocks noGrp="1"/>
+          </p:cNvSpPr>
+          <p:nvPr>
+            <p:ph type="title"/>
+          </p:nvPr>
+        </p:nvSpPr>
+        <p:spPr/>
+        <p:txBody>
+          <a:bodyPr/>
+          <a:lstStyle/>
+          <a:p>
+            <a:r>
+              <a:rPr lang="en-US" dirty="0"/>
+              <a:t>Reading and Writing	</a:t>
+            </a:r>
+          </a:p>
+        </p:txBody>
+      </p:sp>
+      <p:sp>
+        <p:nvSpPr>
+          <p:cNvPr id="3" name="Content Placeholder 2">
+            <a:extLst>
+              <a:ext uri="{FF2B5EF4-FFF2-40B4-BE49-F238E27FC236}">
+                <a16:creationId xmlns:a16="http://schemas.microsoft.com/office/drawing/2014/main" id="{F53DEA1F-1AC9-E145-B3EE-8DAF1FCB447E}"/>
+              </a:ext>
+            </a:extLst>
+          </p:cNvPr>
+          <p:cNvSpPr>
+            <a:spLocks noGrp="1"/>
+          </p:cNvSpPr>
+          <p:nvPr>
+            <p:ph idx="1"/>
+          </p:nvPr>
+        </p:nvSpPr>
+        <p:spPr/>
+        <p:txBody>
+          <a:bodyPr/>
+          <a:lstStyle/>
+          <a:p>
+            <a:r>
+              <a:rPr lang="en-US" dirty="0"/>
+              <a:t>When you both read and write a data structure in the same method, you cannot reliable use </a:t>
+            </a:r>
+            <a:r>
+              <a:rPr lang="en-US" dirty="0">
+                <a:latin typeface="Andale Mono" panose="020B0509000000000004" pitchFamily="49" charset="0"/>
+              </a:rPr>
+              <a:t>extends</a:t>
+            </a:r>
+            <a:r>
+              <a:rPr lang="en-US" dirty="0"/>
+              <a:t> or </a:t>
+            </a:r>
+            <a:r>
+              <a:rPr lang="en-US" dirty="0">
+                <a:latin typeface="Andale Mono" panose="020B0509000000000004" pitchFamily="49" charset="0"/>
+              </a:rPr>
+              <a:t>super</a:t>
+            </a:r>
+            <a:endParaRPr lang="en-US" dirty="0"/>
+          </a:p>
+          <a:p>
+            <a:r>
+              <a:rPr lang="en-US" dirty="0"/>
+              <a:t>You need to use a specific type instead</a:t>
+            </a:r>
+          </a:p>
+        </p:txBody>
+      </p:sp>
+    </p:spTree>
+    <p:extLst>
+      <p:ext uri="{BB962C8B-B14F-4D97-AF65-F5344CB8AC3E}">
+        <p14:creationId xmlns:p14="http://schemas.microsoft.com/office/powerpoint/2010/main" val="3667018963"/>
       </p:ext>
     </p:extLst>
   </p:cSld>

</xml_diff>